<commit_message>
readme now has previews
if it works
</commit_message>
<xml_diff>
--- a/vs_code_style/vs_code_style.pptx
+++ b/vs_code_style/vs_code_style.pptx
@@ -106,6 +106,11 @@
       </a:defRPr>
     </a:lvl9pPr>
   </p:defaultTextStyle>
+  <p:extLst>
+    <p:ext uri="{EFAFB233-063F-42B5-8137-9DF3F51BA10A}">
+      <p15:sldGuideLst xmlns:p15="http://schemas.microsoft.com/office/powerpoint/2012/main"/>
+    </p:ext>
+  </p:extLst>
 </p:presentation>
 </file>
 
@@ -3323,42 +3328,6 @@
           <a:chExt cx="0" cy="0"/>
         </a:xfrm>
       </p:grpSpPr>
-      <p:pic>
-        <p:nvPicPr>
-          <p:cNvPr id="25" name="图片 24">
-            <a:extLst>
-              <a:ext uri="{FF2B5EF4-FFF2-40B4-BE49-F238E27FC236}">
-                <a16:creationId xmlns:a16="http://schemas.microsoft.com/office/drawing/2014/main" id="{DBF065C6-4732-4653-883A-6F118869DBE0}"/>
-              </a:ext>
-            </a:extLst>
-          </p:cNvPr>
-          <p:cNvPicPr>
-            <a:picLocks noChangeAspect="1"/>
-          </p:cNvPicPr>
-          <p:nvPr/>
-        </p:nvPicPr>
-        <p:blipFill>
-          <a:blip r:embed="rId2">
-            <a:extLst>
-              <a:ext uri="{28A0092B-C50C-407E-A947-70E740481C1C}">
-                <a14:useLocalDpi xmlns:a14="http://schemas.microsoft.com/office/drawing/2010/main" val="0"/>
-              </a:ext>
-            </a:extLst>
-          </a:blip>
-          <a:stretch>
-            <a:fillRect/>
-          </a:stretch>
-        </p:blipFill>
-        <p:spPr>
-          <a:xfrm>
-            <a:off x="-236760" y="-390646"/>
-            <a:ext cx="2896086" cy="2896086"/>
-          </a:xfrm>
-          <a:prstGeom prst="rect">
-            <a:avLst/>
-          </a:prstGeom>
-        </p:spPr>
-      </p:pic>
       <p:sp>
         <p:nvSpPr>
           <p:cNvPr id="2" name="标题 1">
@@ -8109,6 +8078,45 @@
           </a:graphicData>
         </a:graphic>
       </p:graphicFrame>
+      <p:pic>
+        <p:nvPicPr>
+          <p:cNvPr id="5" name="图形 4" descr="猫">
+            <a:extLst>
+              <a:ext uri="{FF2B5EF4-FFF2-40B4-BE49-F238E27FC236}">
+                <a16:creationId xmlns:a16="http://schemas.microsoft.com/office/drawing/2014/main" id="{91BD0DCE-BF73-45FA-96C6-892AE2504951}"/>
+              </a:ext>
+            </a:extLst>
+          </p:cNvPr>
+          <p:cNvPicPr>
+            <a:picLocks noChangeAspect="1"/>
+          </p:cNvPicPr>
+          <p:nvPr/>
+        </p:nvPicPr>
+        <p:blipFill>
+          <a:blip r:embed="rId2">
+            <a:extLst>
+              <a:ext uri="{28A0092B-C50C-407E-A947-70E740481C1C}">
+                <a14:useLocalDpi xmlns:a14="http://schemas.microsoft.com/office/drawing/2010/main" val="0"/>
+              </a:ext>
+              <a:ext uri="{96DAC541-7B7A-43D3-8B79-37D633B846F1}">
+                <asvg:svgBlip xmlns:asvg="http://schemas.microsoft.com/office/drawing/2016/SVG/main" r:embed="rId3"/>
+              </a:ext>
+            </a:extLst>
+          </a:blip>
+          <a:stretch>
+            <a:fillRect/>
+          </a:stretch>
+        </p:blipFill>
+        <p:spPr>
+          <a:xfrm>
+            <a:off x="838200" y="17706"/>
+            <a:ext cx="801685" cy="801685"/>
+          </a:xfrm>
+          <a:prstGeom prst="rect">
+            <a:avLst/>
+          </a:prstGeom>
+        </p:spPr>
+      </p:pic>
     </p:spTree>
     <p:extLst>
       <p:ext uri="{BB962C8B-B14F-4D97-AF65-F5344CB8AC3E}">

</xml_diff>